<commit_message>
Add page number to presentation slides. Removed literature sources from presentation. Add tasks title (calendar) to master.
</commit_message>
<xml_diff>
--- a/Presentation.pptx
+++ b/Presentation.pptx
@@ -1,11 +1,11 @@
 
 <file path=ppt/presentation.xml><?xml version="1.0" encoding="utf-8"?>
-<p:presentation xmlns:a="http://schemas.openxmlformats.org/drawingml/2006/main" xmlns:r="http://schemas.openxmlformats.org/officeDocument/2006/relationships" xmlns:p="http://schemas.openxmlformats.org/presentationml/2006/main" saveSubsetFonts="1">
+<p:presentation xmlns:a="http://schemas.openxmlformats.org/drawingml/2006/main" xmlns:r="http://schemas.openxmlformats.org/officeDocument/2006/relationships" xmlns:p="http://schemas.openxmlformats.org/presentationml/2006/main" showSpecialPlsOnTitleSld="0" saveSubsetFonts="1">
   <p:sldMasterIdLst>
     <p:sldMasterId id="2147483648" r:id="rId1"/>
   </p:sldMasterIdLst>
   <p:notesMasterIdLst>
-    <p:notesMasterId r:id="rId16"/>
+    <p:notesMasterId r:id="rId15"/>
   </p:notesMasterIdLst>
   <p:sldIdLst>
     <p:sldId id="256" r:id="rId2"/>
@@ -21,7 +21,6 @@
     <p:sldId id="274" r:id="rId12"/>
     <p:sldId id="263" r:id="rId13"/>
     <p:sldId id="273" r:id="rId14"/>
-    <p:sldId id="266" r:id="rId15"/>
   </p:sldIdLst>
   <p:sldSz cx="12192000" cy="6858000"/>
   <p:notesSz cx="6858000" cy="9144000"/>
@@ -205,7 +204,7 @@
           <a:p>
             <a:fld id="{73015205-2933-4163-9D3E-BEFF2A6E4666}" type="datetimeFigureOut">
               <a:rPr lang="ru-RU" smtClean="0"/>
-              <a:t>12.05.2016</a:t>
+              <a:t>28.05.2016</a:t>
             </a:fld>
             <a:endParaRPr lang="ru-RU"/>
           </a:p>
@@ -517,18 +516,6 @@
           <a:bodyPr/>
           <a:lstStyle/>
           <a:p>
-            <a:r>
-              <a:rPr lang="ru-RU" dirty="0" err="1" smtClean="0"/>
-              <a:t>Дис</a:t>
-            </a:r>
-            <a:r>
-              <a:rPr lang="ru-RU" dirty="0" smtClean="0"/>
-              <a:t>. Наумова стр. </a:t>
-            </a:r>
-            <a:r>
-              <a:rPr lang="ru-RU" smtClean="0"/>
-              <a:t>22</a:t>
-            </a:r>
             <a:endParaRPr lang="ru-RU"/>
           </a:p>
         </p:txBody>
@@ -550,7 +537,7 @@
           <a:p>
             <a:fld id="{7AE4E489-71EA-4A4B-B994-D04221ADFEF2}" type="slidenum">
               <a:rPr lang="ru-RU" smtClean="0"/>
-              <a:t>5</a:t>
+              <a:t>1</a:t>
             </a:fld>
             <a:endParaRPr lang="ru-RU"/>
           </a:p>
@@ -559,7 +546,7 @@
     </p:spTree>
     <p:extLst>
       <p:ext uri="{BB962C8B-B14F-4D97-AF65-F5344CB8AC3E}">
-        <p14:creationId xmlns:p14="http://schemas.microsoft.com/office/powerpoint/2010/main" val="353217243"/>
+        <p14:creationId xmlns:p14="http://schemas.microsoft.com/office/powerpoint/2010/main" val="844005467"/>
       </p:ext>
     </p:extLst>
   </p:cSld>
@@ -614,27 +601,18 @@
           <a:lstStyle/>
           <a:p>
             <a:r>
-              <a:rPr lang="ru-RU" sz="1200" dirty="0" smtClean="0">
-                <a:latin typeface="Arial" panose="020B0604020202020204" pitchFamily="34" charset="0"/>
-                <a:cs typeface="Arial" panose="020B0604020202020204" pitchFamily="34" charset="0"/>
-              </a:rPr>
-              <a:t>VISSIM</a:t>
-            </a:r>
-            <a:r>
-              <a:rPr lang="ru-RU" sz="1200" b="1" dirty="0" smtClean="0">
-                <a:latin typeface="Arial" panose="020B0604020202020204" pitchFamily="34" charset="0"/>
-                <a:cs typeface="Arial" panose="020B0604020202020204" pitchFamily="34" charset="0"/>
-              </a:rPr>
-              <a:t> </a:t>
-            </a:r>
-            <a:r>
-              <a:rPr lang="ru-RU" sz="1200" dirty="0" smtClean="0">
-                <a:latin typeface="Arial" panose="020B0604020202020204" pitchFamily="34" charset="0"/>
-                <a:cs typeface="Arial" panose="020B0604020202020204" pitchFamily="34" charset="0"/>
-              </a:rPr>
-              <a:t>– моделирование любых видов транспорта на микроуровне, моделирование работы сигнальных устройств, прогнозирование транспортных пробок, выбор оптимальной организации движения на перекрестке и оценка пропускной способности для каждого варианта движения.</a:t>
-            </a:r>
-            <a:endParaRPr lang="ru-RU" dirty="0"/>
+              <a:rPr lang="ru-RU" dirty="0" err="1" smtClean="0"/>
+              <a:t>Дис</a:t>
+            </a:r>
+            <a:r>
+              <a:rPr lang="ru-RU" dirty="0" smtClean="0"/>
+              <a:t>. Наумова стр. </a:t>
+            </a:r>
+            <a:r>
+              <a:rPr lang="ru-RU" smtClean="0"/>
+              <a:t>22</a:t>
+            </a:r>
+            <a:endParaRPr lang="ru-RU"/>
           </a:p>
         </p:txBody>
       </p:sp>
@@ -655,7 +633,7 @@
           <a:p>
             <a:fld id="{7AE4E489-71EA-4A4B-B994-D04221ADFEF2}" type="slidenum">
               <a:rPr lang="ru-RU" smtClean="0"/>
-              <a:t>8</a:t>
+              <a:t>5</a:t>
             </a:fld>
             <a:endParaRPr lang="ru-RU"/>
           </a:p>
@@ -664,7 +642,7 @@
     </p:spTree>
     <p:extLst>
       <p:ext uri="{BB962C8B-B14F-4D97-AF65-F5344CB8AC3E}">
-        <p14:creationId xmlns:p14="http://schemas.microsoft.com/office/powerpoint/2010/main" val="1548722605"/>
+        <p14:creationId xmlns:p14="http://schemas.microsoft.com/office/powerpoint/2010/main" val="353217243"/>
       </p:ext>
     </p:extLst>
   </p:cSld>
@@ -719,139 +697,25 @@
           <a:lstStyle/>
           <a:p>
             <a:r>
-              <a:rPr lang="ru-RU" sz="1200" b="1" i="1" u="none" strike="noStrike" kern="1200" baseline="0" dirty="0" smtClean="0">
-                <a:solidFill>
-                  <a:schemeClr val="tx1"/>
-                </a:solidFill>
-                <a:latin typeface="+mn-lt"/>
-                <a:ea typeface="+mn-ea"/>
-                <a:cs typeface="+mn-cs"/>
-              </a:rPr>
-              <a:t>СВЕТОФОР </a:t>
-            </a:r>
-            <a:r>
-              <a:rPr lang="ru-RU" sz="1200" b="0" i="0" u="none" strike="noStrike" kern="1200" baseline="0" dirty="0" smtClean="0">
-                <a:solidFill>
-                  <a:schemeClr val="tx1"/>
-                </a:solidFill>
-                <a:latin typeface="+mn-lt"/>
-                <a:ea typeface="+mn-ea"/>
-                <a:cs typeface="+mn-cs"/>
-              </a:rPr>
-              <a:t>– Проектирование режимов жесткого регулирования при </a:t>
-            </a:r>
-            <a:r>
-              <a:rPr lang="ru-RU" sz="1200" b="0" i="0" u="none" strike="noStrike" kern="1200" baseline="0" dirty="0" err="1" smtClean="0">
-                <a:solidFill>
-                  <a:schemeClr val="tx1"/>
-                </a:solidFill>
-                <a:latin typeface="+mn-lt"/>
-                <a:ea typeface="+mn-ea"/>
-                <a:cs typeface="+mn-cs"/>
-              </a:rPr>
-              <a:t>пофазном</a:t>
-            </a:r>
-            <a:r>
-              <a:rPr lang="ru-RU" sz="1200" b="0" i="0" u="none" strike="noStrike" kern="1200" baseline="0" dirty="0" smtClean="0">
-                <a:solidFill>
-                  <a:schemeClr val="tx1"/>
-                </a:solidFill>
-                <a:latin typeface="+mn-lt"/>
-                <a:ea typeface="+mn-ea"/>
-                <a:cs typeface="+mn-cs"/>
-              </a:rPr>
-              <a:t> управлении движения. Оценка эффективности режимов</a:t>
-            </a:r>
-          </a:p>
-          <a:p>
-            <a:r>
-              <a:rPr lang="ru-RU" sz="1200" b="0" i="0" u="none" strike="noStrike" kern="1200" baseline="0" dirty="0" smtClean="0">
-                <a:solidFill>
-                  <a:schemeClr val="tx1"/>
-                </a:solidFill>
-                <a:latin typeface="+mn-lt"/>
-                <a:ea typeface="+mn-ea"/>
-                <a:cs typeface="+mn-cs"/>
-              </a:rPr>
-              <a:t>регулирования. Программа предоставляет расчет задержек регулирования на всех элементах регулируемого пересечения (полоса, группа движения, подход,</a:t>
-            </a:r>
-          </a:p>
-          <a:p>
-            <a:r>
-              <a:rPr lang="ru-RU" sz="1200" b="0" i="0" u="none" strike="noStrike" kern="1200" baseline="0" dirty="0" smtClean="0">
-                <a:solidFill>
-                  <a:schemeClr val="tx1"/>
-                </a:solidFill>
-                <a:latin typeface="+mn-lt"/>
-                <a:ea typeface="+mn-ea"/>
-                <a:cs typeface="+mn-cs"/>
-              </a:rPr>
-              <a:t>перекресток в целом).</a:t>
-            </a:r>
-          </a:p>
-          <a:p>
-            <a:r>
-              <a:rPr lang="ru-RU" sz="1200" b="0" i="0" u="none" strike="noStrike" kern="1200" baseline="0" dirty="0" smtClean="0">
-                <a:solidFill>
-                  <a:schemeClr val="tx1"/>
-                </a:solidFill>
-                <a:latin typeface="+mn-lt"/>
-                <a:ea typeface="+mn-ea"/>
-                <a:cs typeface="+mn-cs"/>
-              </a:rPr>
-              <a:t>В программе можно изменять такие параметры, как длительности цикла регулирования и основных тактов, потерянное время в начале и в конце фазы,</a:t>
-            </a:r>
-          </a:p>
-          <a:p>
-            <a:r>
-              <a:rPr lang="ru-RU" sz="1200" b="0" i="0" u="none" strike="noStrike" kern="1200" baseline="0" dirty="0" smtClean="0">
-                <a:solidFill>
-                  <a:schemeClr val="tx1"/>
-                </a:solidFill>
-                <a:latin typeface="+mn-lt"/>
-                <a:ea typeface="+mn-ea"/>
-                <a:cs typeface="+mn-cs"/>
-              </a:rPr>
-              <a:t>количество фаз регулирования (до пяти фаз), интенсивности движения по всем направлениям на перекрестке, количество полос на каждом из подходов, их</a:t>
-            </a:r>
-          </a:p>
-          <a:p>
-            <a:r>
-              <a:rPr lang="ru-RU" sz="1200" b="0" i="0" u="none" strike="noStrike" kern="1200" baseline="0" dirty="0" smtClean="0">
-                <a:solidFill>
-                  <a:schemeClr val="tx1"/>
-                </a:solidFill>
-                <a:latin typeface="+mn-lt"/>
-                <a:ea typeface="+mn-ea"/>
-                <a:cs typeface="+mn-cs"/>
-              </a:rPr>
-              <a:t>ширину и виды движения на них. Также представляется возможным учитывать влияние на движение транспорта, вызванное такими внешними факторами, как</a:t>
-            </a:r>
-          </a:p>
-          <a:p>
-            <a:r>
-              <a:rPr lang="ru-RU" sz="1200" b="0" i="0" u="none" strike="noStrike" kern="1200" baseline="0" dirty="0" smtClean="0">
-                <a:solidFill>
-                  <a:schemeClr val="tx1"/>
-                </a:solidFill>
-                <a:latin typeface="+mn-lt"/>
-                <a:ea typeface="+mn-ea"/>
-                <a:cs typeface="+mn-cs"/>
-              </a:rPr>
-              <a:t>движение пешеходов, наличие парковок, наличие остановочных пунктов общественного транспорта и влияние предыдущего светофорного объекта на</a:t>
-            </a:r>
-          </a:p>
-          <a:p>
-            <a:r>
-              <a:rPr lang="ru-RU" sz="1200" b="0" i="0" u="none" strike="noStrike" kern="1200" baseline="0" dirty="0" smtClean="0">
-                <a:solidFill>
-                  <a:schemeClr val="tx1"/>
-                </a:solidFill>
-                <a:latin typeface="+mn-lt"/>
-                <a:ea typeface="+mn-ea"/>
-                <a:cs typeface="+mn-cs"/>
-              </a:rPr>
-              <a:t>рассматриваемый перекресток.</a:t>
+              <a:rPr lang="ru-RU" sz="1200" dirty="0" smtClean="0">
+                <a:latin typeface="Arial" panose="020B0604020202020204" pitchFamily="34" charset="0"/>
+                <a:cs typeface="Arial" panose="020B0604020202020204" pitchFamily="34" charset="0"/>
+              </a:rPr>
+              <a:t>VISSIM</a:t>
+            </a:r>
+            <a:r>
+              <a:rPr lang="ru-RU" sz="1200" b="1" dirty="0" smtClean="0">
+                <a:latin typeface="Arial" panose="020B0604020202020204" pitchFamily="34" charset="0"/>
+                <a:cs typeface="Arial" panose="020B0604020202020204" pitchFamily="34" charset="0"/>
+              </a:rPr>
+              <a:t> </a:t>
+            </a:r>
+            <a:r>
+              <a:rPr lang="ru-RU" sz="1200" dirty="0" smtClean="0">
+                <a:latin typeface="Arial" panose="020B0604020202020204" pitchFamily="34" charset="0"/>
+                <a:cs typeface="Arial" panose="020B0604020202020204" pitchFamily="34" charset="0"/>
+              </a:rPr>
+              <a:t>– моделирование любых видов транспорта на микроуровне, моделирование работы сигнальных устройств, прогнозирование транспортных пробок, выбор оптимальной организации движения на перекрестке и оценка пропускной способности для каждого варианта движения.</a:t>
             </a:r>
             <a:endParaRPr lang="ru-RU" dirty="0"/>
           </a:p>
@@ -874,7 +738,7 @@
           <a:p>
             <a:fld id="{7AE4E489-71EA-4A4B-B994-D04221ADFEF2}" type="slidenum">
               <a:rPr lang="ru-RU" smtClean="0"/>
-              <a:t>9</a:t>
+              <a:t>8</a:t>
             </a:fld>
             <a:endParaRPr lang="ru-RU"/>
           </a:p>
@@ -883,7 +747,7 @@
     </p:spTree>
     <p:extLst>
       <p:ext uri="{BB962C8B-B14F-4D97-AF65-F5344CB8AC3E}">
-        <p14:creationId xmlns:p14="http://schemas.microsoft.com/office/powerpoint/2010/main" val="3372485716"/>
+        <p14:creationId xmlns:p14="http://schemas.microsoft.com/office/powerpoint/2010/main" val="1548722605"/>
       </p:ext>
     </p:extLst>
   </p:cSld>
@@ -938,6 +802,225 @@
           <a:lstStyle/>
           <a:p>
             <a:r>
+              <a:rPr lang="ru-RU" sz="1200" b="1" i="1" u="none" strike="noStrike" kern="1200" baseline="0" dirty="0" smtClean="0">
+                <a:solidFill>
+                  <a:schemeClr val="tx1"/>
+                </a:solidFill>
+                <a:latin typeface="+mn-lt"/>
+                <a:ea typeface="+mn-ea"/>
+                <a:cs typeface="+mn-cs"/>
+              </a:rPr>
+              <a:t>СВЕТОФОР </a:t>
+            </a:r>
+            <a:r>
+              <a:rPr lang="ru-RU" sz="1200" b="0" i="0" u="none" strike="noStrike" kern="1200" baseline="0" dirty="0" smtClean="0">
+                <a:solidFill>
+                  <a:schemeClr val="tx1"/>
+                </a:solidFill>
+                <a:latin typeface="+mn-lt"/>
+                <a:ea typeface="+mn-ea"/>
+                <a:cs typeface="+mn-cs"/>
+              </a:rPr>
+              <a:t>– Проектирование режимов жесткого регулирования при </a:t>
+            </a:r>
+            <a:r>
+              <a:rPr lang="ru-RU" sz="1200" b="0" i="0" u="none" strike="noStrike" kern="1200" baseline="0" dirty="0" err="1" smtClean="0">
+                <a:solidFill>
+                  <a:schemeClr val="tx1"/>
+                </a:solidFill>
+                <a:latin typeface="+mn-lt"/>
+                <a:ea typeface="+mn-ea"/>
+                <a:cs typeface="+mn-cs"/>
+              </a:rPr>
+              <a:t>пофазном</a:t>
+            </a:r>
+            <a:r>
+              <a:rPr lang="ru-RU" sz="1200" b="0" i="0" u="none" strike="noStrike" kern="1200" baseline="0" dirty="0" smtClean="0">
+                <a:solidFill>
+                  <a:schemeClr val="tx1"/>
+                </a:solidFill>
+                <a:latin typeface="+mn-lt"/>
+                <a:ea typeface="+mn-ea"/>
+                <a:cs typeface="+mn-cs"/>
+              </a:rPr>
+              <a:t> управлении движения. Оценка эффективности режимов</a:t>
+            </a:r>
+          </a:p>
+          <a:p>
+            <a:r>
+              <a:rPr lang="ru-RU" sz="1200" b="0" i="0" u="none" strike="noStrike" kern="1200" baseline="0" dirty="0" smtClean="0">
+                <a:solidFill>
+                  <a:schemeClr val="tx1"/>
+                </a:solidFill>
+                <a:latin typeface="+mn-lt"/>
+                <a:ea typeface="+mn-ea"/>
+                <a:cs typeface="+mn-cs"/>
+              </a:rPr>
+              <a:t>регулирования. Программа предоставляет расчет задержек регулирования на всех элементах регулируемого пересечения (полоса, группа движения, подход,</a:t>
+            </a:r>
+          </a:p>
+          <a:p>
+            <a:r>
+              <a:rPr lang="ru-RU" sz="1200" b="0" i="0" u="none" strike="noStrike" kern="1200" baseline="0" dirty="0" smtClean="0">
+                <a:solidFill>
+                  <a:schemeClr val="tx1"/>
+                </a:solidFill>
+                <a:latin typeface="+mn-lt"/>
+                <a:ea typeface="+mn-ea"/>
+                <a:cs typeface="+mn-cs"/>
+              </a:rPr>
+              <a:t>перекресток в целом).</a:t>
+            </a:r>
+          </a:p>
+          <a:p>
+            <a:r>
+              <a:rPr lang="ru-RU" sz="1200" b="0" i="0" u="none" strike="noStrike" kern="1200" baseline="0" dirty="0" smtClean="0">
+                <a:solidFill>
+                  <a:schemeClr val="tx1"/>
+                </a:solidFill>
+                <a:latin typeface="+mn-lt"/>
+                <a:ea typeface="+mn-ea"/>
+                <a:cs typeface="+mn-cs"/>
+              </a:rPr>
+              <a:t>В программе можно изменять такие параметры, как длительности цикла регулирования и основных тактов, потерянное время в начале и в конце фазы,</a:t>
+            </a:r>
+          </a:p>
+          <a:p>
+            <a:r>
+              <a:rPr lang="ru-RU" sz="1200" b="0" i="0" u="none" strike="noStrike" kern="1200" baseline="0" dirty="0" smtClean="0">
+                <a:solidFill>
+                  <a:schemeClr val="tx1"/>
+                </a:solidFill>
+                <a:latin typeface="+mn-lt"/>
+                <a:ea typeface="+mn-ea"/>
+                <a:cs typeface="+mn-cs"/>
+              </a:rPr>
+              <a:t>количество фаз регулирования (до пяти фаз), интенсивности движения по всем направлениям на перекрестке, количество полос на каждом из подходов, их</a:t>
+            </a:r>
+          </a:p>
+          <a:p>
+            <a:r>
+              <a:rPr lang="ru-RU" sz="1200" b="0" i="0" u="none" strike="noStrike" kern="1200" baseline="0" dirty="0" smtClean="0">
+                <a:solidFill>
+                  <a:schemeClr val="tx1"/>
+                </a:solidFill>
+                <a:latin typeface="+mn-lt"/>
+                <a:ea typeface="+mn-ea"/>
+                <a:cs typeface="+mn-cs"/>
+              </a:rPr>
+              <a:t>ширину и виды движения на них. Также представляется возможным учитывать влияние на движение транспорта, вызванное такими внешними факторами, как</a:t>
+            </a:r>
+          </a:p>
+          <a:p>
+            <a:r>
+              <a:rPr lang="ru-RU" sz="1200" b="0" i="0" u="none" strike="noStrike" kern="1200" baseline="0" dirty="0" smtClean="0">
+                <a:solidFill>
+                  <a:schemeClr val="tx1"/>
+                </a:solidFill>
+                <a:latin typeface="+mn-lt"/>
+                <a:ea typeface="+mn-ea"/>
+                <a:cs typeface="+mn-cs"/>
+              </a:rPr>
+              <a:t>движение пешеходов, наличие парковок, наличие остановочных пунктов общественного транспорта и влияние предыдущего светофорного объекта на</a:t>
+            </a:r>
+          </a:p>
+          <a:p>
+            <a:r>
+              <a:rPr lang="ru-RU" sz="1200" b="0" i="0" u="none" strike="noStrike" kern="1200" baseline="0" dirty="0" smtClean="0">
+                <a:solidFill>
+                  <a:schemeClr val="tx1"/>
+                </a:solidFill>
+                <a:latin typeface="+mn-lt"/>
+                <a:ea typeface="+mn-ea"/>
+                <a:cs typeface="+mn-cs"/>
+              </a:rPr>
+              <a:t>рассматриваемый перекресток.</a:t>
+            </a:r>
+            <a:endParaRPr lang="ru-RU" dirty="0"/>
+          </a:p>
+        </p:txBody>
+      </p:sp>
+      <p:sp>
+        <p:nvSpPr>
+          <p:cNvPr id="4" name="Номер слайда 3"/>
+          <p:cNvSpPr>
+            <a:spLocks noGrp="1"/>
+          </p:cNvSpPr>
+          <p:nvPr>
+            <p:ph type="sldNum" sz="quarter" idx="10"/>
+          </p:nvPr>
+        </p:nvSpPr>
+        <p:spPr/>
+        <p:txBody>
+          <a:bodyPr/>
+          <a:lstStyle/>
+          <a:p>
+            <a:fld id="{7AE4E489-71EA-4A4B-B994-D04221ADFEF2}" type="slidenum">
+              <a:rPr lang="ru-RU" smtClean="0"/>
+              <a:t>9</a:t>
+            </a:fld>
+            <a:endParaRPr lang="ru-RU"/>
+          </a:p>
+        </p:txBody>
+      </p:sp>
+    </p:spTree>
+    <p:extLst>
+      <p:ext uri="{BB962C8B-B14F-4D97-AF65-F5344CB8AC3E}">
+        <p14:creationId xmlns:p14="http://schemas.microsoft.com/office/powerpoint/2010/main" val="3372485716"/>
+      </p:ext>
+    </p:extLst>
+  </p:cSld>
+  <p:clrMapOvr>
+    <a:masterClrMapping/>
+  </p:clrMapOvr>
+</p:notes>
+</file>
+
+<file path=ppt/notesSlides/notesSlide5.xml><?xml version="1.0" encoding="utf-8"?>
+<p:notes xmlns:a="http://schemas.openxmlformats.org/drawingml/2006/main" xmlns:r="http://schemas.openxmlformats.org/officeDocument/2006/relationships" xmlns:p="http://schemas.openxmlformats.org/presentationml/2006/main">
+  <p:cSld>
+    <p:spTree>
+      <p:nvGrpSpPr>
+        <p:cNvPr id="1" name=""/>
+        <p:cNvGrpSpPr/>
+        <p:nvPr/>
+      </p:nvGrpSpPr>
+      <p:grpSpPr>
+        <a:xfrm>
+          <a:off x="0" y="0"/>
+          <a:ext cx="0" cy="0"/>
+          <a:chOff x="0" y="0"/>
+          <a:chExt cx="0" cy="0"/>
+        </a:xfrm>
+      </p:grpSpPr>
+      <p:sp>
+        <p:nvSpPr>
+          <p:cNvPr id="2" name="Образ слайда 1"/>
+          <p:cNvSpPr>
+            <a:spLocks noGrp="1" noRot="1" noChangeAspect="1"/>
+          </p:cNvSpPr>
+          <p:nvPr>
+            <p:ph type="sldImg"/>
+          </p:nvPr>
+        </p:nvSpPr>
+        <p:spPr/>
+      </p:sp>
+      <p:sp>
+        <p:nvSpPr>
+          <p:cNvPr id="3" name="Заметки 2"/>
+          <p:cNvSpPr>
+            <a:spLocks noGrp="1"/>
+          </p:cNvSpPr>
+          <p:nvPr>
+            <p:ph type="body" idx="1"/>
+          </p:nvPr>
+        </p:nvSpPr>
+        <p:spPr/>
+        <p:txBody>
+          <a:bodyPr/>
+          <a:lstStyle/>
+          <a:p>
+            <a:r>
               <a:rPr lang="ru-RU" sz="1200" b="1" dirty="0" smtClean="0">
                 <a:latin typeface="Times New Roman" panose="02020603050405020304" pitchFamily="18" charset="0"/>
                 <a:cs typeface="Times New Roman" panose="02020603050405020304" pitchFamily="18" charset="0"/>
@@ -1146,7 +1229,7 @@
 </p:notes>
 </file>
 
-<file path=ppt/notesSlides/notesSlide5.xml><?xml version="1.0" encoding="utf-8"?>
+<file path=ppt/notesSlides/notesSlide6.xml><?xml version="1.0" encoding="utf-8"?>
 <p:notes xmlns:a="http://schemas.openxmlformats.org/drawingml/2006/main" xmlns:r="http://schemas.openxmlformats.org/officeDocument/2006/relationships" xmlns:p="http://schemas.openxmlformats.org/presentationml/2006/main">
   <p:cSld>
     <p:spTree>
@@ -1359,9 +1442,9 @@
           <a:bodyPr/>
           <a:lstStyle/>
           <a:p>
-            <a:fld id="{101551C9-B7DF-4408-9FE8-BCA2916BB10C}" type="datetimeFigureOut">
-              <a:rPr lang="ru-RU" smtClean="0"/>
-              <a:t>12.05.2016</a:t>
+            <a:fld id="{FC66B365-1D64-4C12-9AAB-5C98E17BE049}" type="datetime1">
+              <a:rPr lang="ru-RU" smtClean="0"/>
+              <a:t>28.05.2016</a:t>
             </a:fld>
             <a:endParaRPr lang="ru-RU"/>
           </a:p>
@@ -1529,9 +1612,9 @@
           <a:bodyPr/>
           <a:lstStyle/>
           <a:p>
-            <a:fld id="{101551C9-B7DF-4408-9FE8-BCA2916BB10C}" type="datetimeFigureOut">
-              <a:rPr lang="ru-RU" smtClean="0"/>
-              <a:t>12.05.2016</a:t>
+            <a:fld id="{15C10318-B1F7-44B7-87DE-DD5F751AF802}" type="datetime1">
+              <a:rPr lang="ru-RU" smtClean="0"/>
+              <a:t>28.05.2016</a:t>
             </a:fld>
             <a:endParaRPr lang="ru-RU"/>
           </a:p>
@@ -1709,9 +1792,9 @@
           <a:bodyPr/>
           <a:lstStyle/>
           <a:p>
-            <a:fld id="{101551C9-B7DF-4408-9FE8-BCA2916BB10C}" type="datetimeFigureOut">
-              <a:rPr lang="ru-RU" smtClean="0"/>
-              <a:t>12.05.2016</a:t>
+            <a:fld id="{B7A29764-1B85-4A97-8504-9ECE7C0033AB}" type="datetime1">
+              <a:rPr lang="ru-RU" smtClean="0"/>
+              <a:t>28.05.2016</a:t>
             </a:fld>
             <a:endParaRPr lang="ru-RU"/>
           </a:p>
@@ -1879,9 +1962,9 @@
           <a:bodyPr/>
           <a:lstStyle/>
           <a:p>
-            <a:fld id="{101551C9-B7DF-4408-9FE8-BCA2916BB10C}" type="datetimeFigureOut">
-              <a:rPr lang="ru-RU" smtClean="0"/>
-              <a:t>12.05.2016</a:t>
+            <a:fld id="{3E71EC5D-17E4-410F-AEFC-2EBF667008F7}" type="datetime1">
+              <a:rPr lang="ru-RU" smtClean="0"/>
+              <a:t>28.05.2016</a:t>
             </a:fld>
             <a:endParaRPr lang="ru-RU"/>
           </a:p>
@@ -2125,9 +2208,9 @@
           <a:bodyPr/>
           <a:lstStyle/>
           <a:p>
-            <a:fld id="{101551C9-B7DF-4408-9FE8-BCA2916BB10C}" type="datetimeFigureOut">
-              <a:rPr lang="ru-RU" smtClean="0"/>
-              <a:t>12.05.2016</a:t>
+            <a:fld id="{05A9E8B6-AA45-414F-B391-CCF63E6C614B}" type="datetime1">
+              <a:rPr lang="ru-RU" smtClean="0"/>
+              <a:t>28.05.2016</a:t>
             </a:fld>
             <a:endParaRPr lang="ru-RU"/>
           </a:p>
@@ -2357,9 +2440,9 @@
           <a:bodyPr/>
           <a:lstStyle/>
           <a:p>
-            <a:fld id="{101551C9-B7DF-4408-9FE8-BCA2916BB10C}" type="datetimeFigureOut">
-              <a:rPr lang="ru-RU" smtClean="0"/>
-              <a:t>12.05.2016</a:t>
+            <a:fld id="{2FBF4AF1-E06A-4963-B9AC-0A429CF967B6}" type="datetime1">
+              <a:rPr lang="ru-RU" smtClean="0"/>
+              <a:t>28.05.2016</a:t>
             </a:fld>
             <a:endParaRPr lang="ru-RU"/>
           </a:p>
@@ -2724,9 +2807,9 @@
           <a:bodyPr/>
           <a:lstStyle/>
           <a:p>
-            <a:fld id="{101551C9-B7DF-4408-9FE8-BCA2916BB10C}" type="datetimeFigureOut">
-              <a:rPr lang="ru-RU" smtClean="0"/>
-              <a:t>12.05.2016</a:t>
+            <a:fld id="{F0215873-32EF-4188-B8D2-72CB36EB4151}" type="datetime1">
+              <a:rPr lang="ru-RU" smtClean="0"/>
+              <a:t>28.05.2016</a:t>
             </a:fld>
             <a:endParaRPr lang="ru-RU"/>
           </a:p>
@@ -2842,9 +2925,9 @@
           <a:bodyPr/>
           <a:lstStyle/>
           <a:p>
-            <a:fld id="{101551C9-B7DF-4408-9FE8-BCA2916BB10C}" type="datetimeFigureOut">
-              <a:rPr lang="ru-RU" smtClean="0"/>
-              <a:t>12.05.2016</a:t>
+            <a:fld id="{ED1340FD-B9CC-42DE-BC08-8CAB59A1A96D}" type="datetime1">
+              <a:rPr lang="ru-RU" smtClean="0"/>
+              <a:t>28.05.2016</a:t>
             </a:fld>
             <a:endParaRPr lang="ru-RU"/>
           </a:p>
@@ -2937,9 +3020,9 @@
           <a:bodyPr/>
           <a:lstStyle/>
           <a:p>
-            <a:fld id="{101551C9-B7DF-4408-9FE8-BCA2916BB10C}" type="datetimeFigureOut">
-              <a:rPr lang="ru-RU" smtClean="0"/>
-              <a:t>12.05.2016</a:t>
+            <a:fld id="{95D828B8-C819-488F-B167-90C09AE6761E}" type="datetime1">
+              <a:rPr lang="ru-RU" smtClean="0"/>
+              <a:t>28.05.2016</a:t>
             </a:fld>
             <a:endParaRPr lang="ru-RU"/>
           </a:p>
@@ -3214,9 +3297,9 @@
           <a:bodyPr/>
           <a:lstStyle/>
           <a:p>
-            <a:fld id="{101551C9-B7DF-4408-9FE8-BCA2916BB10C}" type="datetimeFigureOut">
-              <a:rPr lang="ru-RU" smtClean="0"/>
-              <a:t>12.05.2016</a:t>
+            <a:fld id="{AD8DF62F-5F57-496A-88D6-FD9AA5D37F2B}" type="datetime1">
+              <a:rPr lang="ru-RU" smtClean="0"/>
+              <a:t>28.05.2016</a:t>
             </a:fld>
             <a:endParaRPr lang="ru-RU"/>
           </a:p>
@@ -3467,9 +3550,9 @@
           <a:bodyPr/>
           <a:lstStyle/>
           <a:p>
-            <a:fld id="{101551C9-B7DF-4408-9FE8-BCA2916BB10C}" type="datetimeFigureOut">
-              <a:rPr lang="ru-RU" smtClean="0"/>
-              <a:t>12.05.2016</a:t>
+            <a:fld id="{D559AFAB-B8C3-48C0-8C53-8C01C2CF6273}" type="datetime1">
+              <a:rPr lang="ru-RU" smtClean="0"/>
+              <a:t>28.05.2016</a:t>
             </a:fld>
             <a:endParaRPr lang="ru-RU"/>
           </a:p>
@@ -3680,9 +3763,9 @@
             </a:lvl1pPr>
           </a:lstStyle>
           <a:p>
-            <a:fld id="{101551C9-B7DF-4408-9FE8-BCA2916BB10C}" type="datetimeFigureOut">
-              <a:rPr lang="ru-RU" smtClean="0"/>
-              <a:t>12.05.2016</a:t>
+            <a:fld id="{D3DB6AA1-9BE2-4675-8C90-A717B2E2B06D}" type="datetime1">
+              <a:rPr lang="ru-RU" smtClean="0"/>
+              <a:t>28.05.2016</a:t>
             </a:fld>
             <a:endParaRPr lang="ru-RU"/>
           </a:p>
@@ -3787,6 +3870,7 @@
     <p:sldLayoutId id="2147483658" r:id="rId10"/>
     <p:sldLayoutId id="2147483659" r:id="rId11"/>
   </p:sldLayoutIdLst>
+  <p:hf hdr="0" ftr="0" dt="0"/>
   <p:txStyles>
     <p:titleStyle>
       <a:lvl1pPr algn="l" defTabSz="914400" rtl="0" eaLnBrk="1" latinLnBrk="0" hangingPunct="1">
@@ -4297,6 +4381,29 @@
           </a:xfrm>
         </p:spPr>
       </p:pic>
+      <p:sp>
+        <p:nvSpPr>
+          <p:cNvPr id="5" name="Номер слайда 4"/>
+          <p:cNvSpPr>
+            <a:spLocks noGrp="1"/>
+          </p:cNvSpPr>
+          <p:nvPr>
+            <p:ph type="sldNum" sz="quarter" idx="12"/>
+          </p:nvPr>
+        </p:nvSpPr>
+        <p:spPr/>
+        <p:txBody>
+          <a:bodyPr/>
+          <a:lstStyle/>
+          <a:p>
+            <a:fld id="{1374FF4F-7CE3-4DCA-8B74-8358E6AEE92B}" type="slidenum">
+              <a:rPr lang="ru-RU" smtClean="0"/>
+              <a:t>10</a:t>
+            </a:fld>
+            <a:endParaRPr lang="ru-RU"/>
+          </a:p>
+        </p:txBody>
+      </p:sp>
     </p:spTree>
     <p:extLst>
       <p:ext uri="{BB962C8B-B14F-4D97-AF65-F5344CB8AC3E}">
@@ -4444,6 +4551,29 @@
             <a:endParaRPr lang="ru-RU" dirty="0">
               <a:cs typeface="Times New Roman" panose="02020603050405020304" pitchFamily="18" charset="0"/>
             </a:endParaRPr>
+          </a:p>
+        </p:txBody>
+      </p:sp>
+      <p:sp>
+        <p:nvSpPr>
+          <p:cNvPr id="5" name="Номер слайда 4"/>
+          <p:cNvSpPr>
+            <a:spLocks noGrp="1"/>
+          </p:cNvSpPr>
+          <p:nvPr>
+            <p:ph type="sldNum" sz="quarter" idx="12"/>
+          </p:nvPr>
+        </p:nvSpPr>
+        <p:spPr/>
+        <p:txBody>
+          <a:bodyPr/>
+          <a:lstStyle/>
+          <a:p>
+            <a:fld id="{1374FF4F-7CE3-4DCA-8B74-8358E6AEE92B}" type="slidenum">
+              <a:rPr lang="ru-RU" smtClean="0"/>
+              <a:t>11</a:t>
+            </a:fld>
+            <a:endParaRPr lang="ru-RU"/>
           </a:p>
         </p:txBody>
       </p:sp>
@@ -4506,6 +4636,29 @@
           </a:xfrm>
         </p:spPr>
       </p:pic>
+      <p:sp>
+        <p:nvSpPr>
+          <p:cNvPr id="3" name="Номер слайда 2"/>
+          <p:cNvSpPr>
+            <a:spLocks noGrp="1"/>
+          </p:cNvSpPr>
+          <p:nvPr>
+            <p:ph type="sldNum" sz="quarter" idx="12"/>
+          </p:nvPr>
+        </p:nvSpPr>
+        <p:spPr/>
+        <p:txBody>
+          <a:bodyPr/>
+          <a:lstStyle/>
+          <a:p>
+            <a:fld id="{1374FF4F-7CE3-4DCA-8B74-8358E6AEE92B}" type="slidenum">
+              <a:rPr lang="ru-RU" smtClean="0"/>
+              <a:t>12</a:t>
+            </a:fld>
+            <a:endParaRPr lang="ru-RU"/>
+          </a:p>
+        </p:txBody>
+      </p:sp>
     </p:spTree>
     <p:extLst>
       <p:ext uri="{BB962C8B-B14F-4D97-AF65-F5344CB8AC3E}">
@@ -4620,6 +4773,29 @@
           </a:xfrm>
         </p:spPr>
       </p:pic>
+      <p:sp>
+        <p:nvSpPr>
+          <p:cNvPr id="4" name="Номер слайда 3"/>
+          <p:cNvSpPr>
+            <a:spLocks noGrp="1"/>
+          </p:cNvSpPr>
+          <p:nvPr>
+            <p:ph type="sldNum" sz="quarter" idx="12"/>
+          </p:nvPr>
+        </p:nvSpPr>
+        <p:spPr/>
+        <p:txBody>
+          <a:bodyPr/>
+          <a:lstStyle/>
+          <a:p>
+            <a:fld id="{1374FF4F-7CE3-4DCA-8B74-8358E6AEE92B}" type="slidenum">
+              <a:rPr lang="ru-RU" smtClean="0"/>
+              <a:t>13</a:t>
+            </a:fld>
+            <a:endParaRPr lang="ru-RU"/>
+          </a:p>
+        </p:txBody>
+      </p:sp>
     </p:spTree>
     <p:extLst>
       <p:ext uri="{BB962C8B-B14F-4D97-AF65-F5344CB8AC3E}">
@@ -4630,346 +4806,6 @@
   <p:clrMapOvr>
     <a:masterClrMapping/>
   </p:clrMapOvr>
-</p:sld>
-</file>
-
-<file path=ppt/slides/slide14.xml><?xml version="1.0" encoding="utf-8"?>
-<p:sld xmlns:a="http://schemas.openxmlformats.org/drawingml/2006/main" xmlns:r="http://schemas.openxmlformats.org/officeDocument/2006/relationships" xmlns:p="http://schemas.openxmlformats.org/presentationml/2006/main">
-  <p:cSld>
-    <p:spTree>
-      <p:nvGrpSpPr>
-        <p:cNvPr id="1" name=""/>
-        <p:cNvGrpSpPr/>
-        <p:nvPr/>
-      </p:nvGrpSpPr>
-      <p:grpSpPr>
-        <a:xfrm>
-          <a:off x="0" y="0"/>
-          <a:ext cx="0" cy="0"/>
-          <a:chOff x="0" y="0"/>
-          <a:chExt cx="0" cy="0"/>
-        </a:xfrm>
-      </p:grpSpPr>
-      <p:sp>
-        <p:nvSpPr>
-          <p:cNvPr id="2" name="Заголовок 1"/>
-          <p:cNvSpPr>
-            <a:spLocks noGrp="1"/>
-          </p:cNvSpPr>
-          <p:nvPr>
-            <p:ph type="title"/>
-          </p:nvPr>
-        </p:nvSpPr>
-        <p:spPr>
-          <a:xfrm>
-            <a:off x="1070212" y="146761"/>
-            <a:ext cx="10515600" cy="1325563"/>
-          </a:xfrm>
-        </p:spPr>
-        <p:txBody>
-          <a:bodyPr/>
-          <a:lstStyle/>
-          <a:p>
-            <a:r>
-              <a:rPr lang="ru-RU" dirty="0" smtClean="0">
-                <a:latin typeface="+mn-lt"/>
-                <a:cs typeface="Times New Roman" panose="02020603050405020304" pitchFamily="18" charset="0"/>
-              </a:rPr>
-              <a:t>Список литературы</a:t>
-            </a:r>
-            <a:endParaRPr lang="ru-RU" dirty="0">
-              <a:latin typeface="+mn-lt"/>
-              <a:cs typeface="Times New Roman" panose="02020603050405020304" pitchFamily="18" charset="0"/>
-            </a:endParaRPr>
-          </a:p>
-        </p:txBody>
-      </p:sp>
-      <p:sp>
-        <p:nvSpPr>
-          <p:cNvPr id="3" name="Объект 2"/>
-          <p:cNvSpPr>
-            <a:spLocks noGrp="1"/>
-          </p:cNvSpPr>
-          <p:nvPr>
-            <p:ph idx="1"/>
-          </p:nvPr>
-        </p:nvSpPr>
-        <p:spPr>
-          <a:xfrm>
-            <a:off x="838200" y="1472324"/>
-            <a:ext cx="10515600" cy="5078601"/>
-          </a:xfrm>
-        </p:spPr>
-        <p:txBody>
-          <a:bodyPr>
-            <a:normAutofit/>
-          </a:bodyPr>
-          <a:lstStyle/>
-          <a:p>
-            <a:pPr algn="just">
-              <a:spcBef>
-                <a:spcPts val="1800"/>
-              </a:spcBef>
-            </a:pPr>
-            <a:r>
-              <a:rPr lang="ru-RU" sz="1800" dirty="0">
-                <a:cs typeface="Times New Roman" panose="02020603050405020304" pitchFamily="18" charset="0"/>
-              </a:rPr>
-              <a:t>1</a:t>
-            </a:r>
-            <a:r>
-              <a:rPr lang="ru-RU" sz="1800" dirty="0" smtClean="0">
-                <a:cs typeface="Times New Roman" panose="02020603050405020304" pitchFamily="18" charset="0"/>
-              </a:rPr>
-              <a:t>. Математические модели управления транспортными потоками. М. М. </a:t>
-            </a:r>
-            <a:r>
-              <a:rPr lang="ru-RU" sz="1800" dirty="0" err="1" smtClean="0">
-                <a:cs typeface="Times New Roman" panose="02020603050405020304" pitchFamily="18" charset="0"/>
-              </a:rPr>
-              <a:t>Ахмадинуров</a:t>
-            </a:r>
-            <a:r>
-              <a:rPr lang="ru-RU" sz="1800" dirty="0" smtClean="0">
-                <a:cs typeface="Times New Roman" panose="02020603050405020304" pitchFamily="18" charset="0"/>
-              </a:rPr>
-              <a:t>, Д.С. </a:t>
-            </a:r>
-            <a:r>
-              <a:rPr lang="ru-RU" sz="1800" dirty="0" err="1" smtClean="0">
-                <a:cs typeface="Times New Roman" panose="02020603050405020304" pitchFamily="18" charset="0"/>
-              </a:rPr>
-              <a:t>Завилищин</a:t>
-            </a:r>
-            <a:r>
-              <a:rPr lang="ru-RU" sz="1800" dirty="0" smtClean="0">
-                <a:cs typeface="Times New Roman" panose="02020603050405020304" pitchFamily="18" charset="0"/>
-              </a:rPr>
-              <a:t>, Г.А. </a:t>
-            </a:r>
-            <a:r>
-              <a:rPr lang="ru-RU" sz="1800" dirty="0" err="1" smtClean="0">
-                <a:cs typeface="Times New Roman" panose="02020603050405020304" pitchFamily="18" charset="0"/>
-              </a:rPr>
-              <a:t>Тимовеева</a:t>
-            </a:r>
-            <a:r>
-              <a:rPr lang="ru-RU" sz="1800" dirty="0" smtClean="0">
-                <a:cs typeface="Times New Roman" panose="02020603050405020304" pitchFamily="18" charset="0"/>
-              </a:rPr>
-              <a:t>, 120 стр., Екатеринбург, 2011 г..</a:t>
-            </a:r>
-          </a:p>
-          <a:p>
-            <a:pPr algn="just">
-              <a:spcBef>
-                <a:spcPts val="1800"/>
-              </a:spcBef>
-            </a:pPr>
-            <a:r>
-              <a:rPr lang="ru-RU" sz="1800" dirty="0" smtClean="0">
-                <a:cs typeface="Times New Roman" panose="02020603050405020304" pitchFamily="18" charset="0"/>
-              </a:rPr>
-              <a:t>2. Проектирование регулируемых пересечений, А.Г. </a:t>
-            </a:r>
-            <a:r>
-              <a:rPr lang="ru-RU" sz="1800" dirty="0" err="1" smtClean="0">
-                <a:cs typeface="Times New Roman" panose="02020603050405020304" pitchFamily="18" charset="0"/>
-              </a:rPr>
-              <a:t>Левашев</a:t>
-            </a:r>
-            <a:r>
-              <a:rPr lang="ru-RU" sz="1800" dirty="0" smtClean="0">
-                <a:cs typeface="Times New Roman" panose="02020603050405020304" pitchFamily="18" charset="0"/>
-              </a:rPr>
-              <a:t>, А.Ю. Михайлов, И.М. Головных, 210 стр. Издательство Иркутского государственного технического университета, 2007 г.</a:t>
-            </a:r>
-            <a:r>
-              <a:rPr lang="en-US" sz="1800" dirty="0" smtClean="0">
-                <a:cs typeface="Times New Roman" panose="02020603050405020304" pitchFamily="18" charset="0"/>
-              </a:rPr>
-              <a:t> </a:t>
-            </a:r>
-            <a:r>
-              <a:rPr lang="en-US" sz="1800" dirty="0" smtClean="0">
-                <a:cs typeface="Times New Roman" panose="02020603050405020304" pitchFamily="18" charset="0"/>
-                <a:hlinkClick r:id="rId2"/>
-              </a:rPr>
-              <a:t>http://window.edu.ru/resource/463/77463/files/signalized_intersections.pdf</a:t>
-            </a:r>
-            <a:endParaRPr lang="ru-RU" sz="1800" dirty="0" smtClean="0">
-              <a:cs typeface="Times New Roman" panose="02020603050405020304" pitchFamily="18" charset="0"/>
-            </a:endParaRPr>
-          </a:p>
-          <a:p>
-            <a:pPr algn="just">
-              <a:spcBef>
-                <a:spcPts val="1800"/>
-              </a:spcBef>
-            </a:pPr>
-            <a:r>
-              <a:rPr lang="ru-RU" sz="1800" dirty="0" smtClean="0">
-                <a:cs typeface="Times New Roman" panose="02020603050405020304" pitchFamily="18" charset="0"/>
-              </a:rPr>
-              <a:t>3. Методика адаптивного управления транспортными потоками высокой интенсивности в условиях города на основе мезо-модели динамики с применением генетических алгоритмов. </a:t>
-            </a:r>
-            <a:r>
-              <a:rPr lang="ru-RU" sz="1800" dirty="0" err="1" smtClean="0">
-                <a:cs typeface="Times New Roman" panose="02020603050405020304" pitchFamily="18" charset="0"/>
-              </a:rPr>
-              <a:t>Посмитный</a:t>
-            </a:r>
-            <a:r>
-              <a:rPr lang="ru-RU" sz="1800" dirty="0" smtClean="0">
-                <a:cs typeface="Times New Roman" panose="02020603050405020304" pitchFamily="18" charset="0"/>
-              </a:rPr>
-              <a:t> Е. В. к.т.н., доцент, </a:t>
-            </a:r>
-            <a:r>
-              <a:rPr lang="ru-RU" sz="1800" dirty="0" err="1" smtClean="0">
-                <a:cs typeface="Times New Roman" panose="02020603050405020304" pitchFamily="18" charset="0"/>
-              </a:rPr>
-              <a:t>Медовщеков</a:t>
-            </a:r>
-            <a:r>
-              <a:rPr lang="ru-RU" sz="1800" dirty="0" smtClean="0">
-                <a:cs typeface="Times New Roman" panose="02020603050405020304" pitchFamily="18" charset="0"/>
-              </a:rPr>
-              <a:t> М.И. аспирант, Кубанский государственный технологический университет, Краснодар, Россия Научный журнал 11 стр. </a:t>
-            </a:r>
-            <a:r>
-              <a:rPr lang="ru-RU" sz="1800" dirty="0" err="1" smtClean="0">
-                <a:cs typeface="Times New Roman" panose="02020603050405020304" pitchFamily="18" charset="0"/>
-              </a:rPr>
-              <a:t>КубГАУ</a:t>
-            </a:r>
-            <a:r>
-              <a:rPr lang="ru-RU" sz="1800" dirty="0" smtClean="0">
-                <a:cs typeface="Times New Roman" panose="02020603050405020304" pitchFamily="18" charset="0"/>
-              </a:rPr>
-              <a:t>, №84(10), 2012 года </a:t>
-            </a:r>
-            <a:r>
-              <a:rPr lang="en-US" sz="1800" dirty="0" smtClean="0">
-                <a:cs typeface="Times New Roman" panose="02020603050405020304" pitchFamily="18" charset="0"/>
-              </a:rPr>
-              <a:t>URL - </a:t>
-            </a:r>
-            <a:r>
-              <a:rPr lang="en-US" sz="1800" dirty="0" smtClean="0">
-                <a:cs typeface="Times New Roman" panose="02020603050405020304" pitchFamily="18" charset="0"/>
-                <a:hlinkClick r:id="rId3"/>
-              </a:rPr>
-              <a:t>http://ej.kubagro.ru/2012/10/pdf/75.pdf</a:t>
-            </a:r>
-            <a:r>
-              <a:rPr lang="en-US" sz="1800" dirty="0" smtClean="0">
-                <a:cs typeface="Times New Roman" panose="02020603050405020304" pitchFamily="18" charset="0"/>
-              </a:rPr>
-              <a:t> </a:t>
-            </a:r>
-            <a:endParaRPr lang="ru-RU" sz="1800" dirty="0" smtClean="0">
-              <a:cs typeface="Times New Roman" panose="02020603050405020304" pitchFamily="18" charset="0"/>
-            </a:endParaRPr>
-          </a:p>
-          <a:p>
-            <a:pPr algn="just">
-              <a:spcBef>
-                <a:spcPts val="1800"/>
-              </a:spcBef>
-            </a:pPr>
-            <a:r>
-              <a:rPr lang="ru-RU" sz="1800" dirty="0" smtClean="0">
-                <a:cs typeface="Times New Roman" panose="02020603050405020304" pitchFamily="18" charset="0"/>
-              </a:rPr>
-              <a:t>4. </a:t>
-            </a:r>
-            <a:r>
-              <a:rPr lang="ru-RU" sz="1800" dirty="0"/>
-              <a:t>Михеева Т.И., Михеев С.В., Богданова И.Г. МОДЕЛИ ТРАНСПОРТНЫХ ПОТОКОВ В ИНТЕЛЛЕКТУАЛЬНЫХ ТРАНСПОРТНЫХ СИСТЕМАХ // Современные проблемы науки и образования. – 2013. – № 6</a:t>
-            </a:r>
-            <a:r>
-              <a:rPr lang="ru-RU" sz="1800" dirty="0" smtClean="0"/>
-              <a:t>.;</a:t>
-            </a:r>
-            <a:r>
-              <a:rPr lang="en-US" sz="1800" dirty="0"/>
-              <a:t> URL: </a:t>
-            </a:r>
-            <a:r>
-              <a:rPr lang="en-US" sz="1800" dirty="0" smtClean="0">
-                <a:hlinkClick r:id="rId4"/>
-              </a:rPr>
-              <a:t>http://www.science-education.ru/ru/article/view?id=11808</a:t>
-            </a:r>
-            <a:r>
-              <a:rPr lang="en-US" sz="1800" dirty="0" smtClean="0"/>
-              <a:t> </a:t>
-            </a:r>
-          </a:p>
-          <a:p>
-            <a:pPr algn="just">
-              <a:spcBef>
-                <a:spcPts val="1800"/>
-              </a:spcBef>
-            </a:pPr>
-            <a:r>
-              <a:rPr lang="en-US" sz="1800" dirty="0" smtClean="0"/>
-              <a:t>5. </a:t>
-            </a:r>
-            <a:r>
-              <a:rPr lang="ru-RU" sz="1800" dirty="0"/>
-              <a:t>Алгоритмы адаптивного регулирования светофорной </a:t>
-            </a:r>
-            <a:r>
-              <a:rPr lang="ru-RU" sz="1800" dirty="0" smtClean="0"/>
-              <a:t>сигнализации</a:t>
-            </a:r>
-            <a:r>
-              <a:rPr lang="en-US" sz="1800" dirty="0"/>
-              <a:t> </a:t>
-            </a:r>
-            <a:r>
-              <a:rPr lang="en-US" sz="1800" dirty="0" smtClean="0">
-                <a:hlinkClick r:id="rId5"/>
-              </a:rPr>
-              <a:t>http://www.wikiznanie.ru/wikipedia/index.php/</a:t>
-            </a:r>
-            <a:r>
-              <a:rPr lang="ru-RU" sz="1800" dirty="0" err="1" smtClean="0">
-                <a:hlinkClick r:id="rId5"/>
-              </a:rPr>
-              <a:t>Алгоритмы_адаптивного_регулирования_светофорной_сигнализации</a:t>
-            </a:r>
-            <a:endParaRPr lang="en-US" sz="1800" dirty="0" smtClean="0"/>
-          </a:p>
-          <a:p>
-            <a:pPr>
-              <a:spcBef>
-                <a:spcPts val="1800"/>
-              </a:spcBef>
-            </a:pPr>
-            <a:endParaRPr lang="ru-RU" sz="1800" dirty="0"/>
-          </a:p>
-        </p:txBody>
-      </p:sp>
-    </p:spTree>
-    <p:extLst>
-      <p:ext uri="{BB962C8B-B14F-4D97-AF65-F5344CB8AC3E}">
-        <p14:creationId xmlns:p14="http://schemas.microsoft.com/office/powerpoint/2010/main" val="747638339"/>
-      </p:ext>
-    </p:extLst>
-  </p:cSld>
-  <p:clrMapOvr>
-    <a:masterClrMapping/>
-  </p:clrMapOvr>
-  <p:timing>
-    <p:tnLst>
-      <p:par>
-        <p:cTn id="1" dur="indefinite" restart="never" nodeType="tmRoot"/>
-      </p:par>
-    </p:tnLst>
-  </p:timing>
 </p:sld>
 </file>
 
@@ -5152,6 +4988,29 @@
           <a:p>
             <a:pPr algn="just"/>
             <a:endParaRPr lang="ru-RU" dirty="0"/>
+          </a:p>
+        </p:txBody>
+      </p:sp>
+      <p:sp>
+        <p:nvSpPr>
+          <p:cNvPr id="5" name="Номер слайда 4"/>
+          <p:cNvSpPr>
+            <a:spLocks noGrp="1"/>
+          </p:cNvSpPr>
+          <p:nvPr>
+            <p:ph type="sldNum" sz="quarter" idx="12"/>
+          </p:nvPr>
+        </p:nvSpPr>
+        <p:spPr/>
+        <p:txBody>
+          <a:bodyPr/>
+          <a:lstStyle/>
+          <a:p>
+            <a:fld id="{1374FF4F-7CE3-4DCA-8B74-8358E6AEE92B}" type="slidenum">
+              <a:rPr lang="ru-RU" smtClean="0"/>
+              <a:t>2</a:t>
+            </a:fld>
+            <a:endParaRPr lang="ru-RU"/>
           </a:p>
         </p:txBody>
       </p:sp>
@@ -5282,6 +5141,29 @@
           </a:p>
         </p:txBody>
       </p:sp>
+      <p:sp>
+        <p:nvSpPr>
+          <p:cNvPr id="5" name="Номер слайда 4"/>
+          <p:cNvSpPr>
+            <a:spLocks noGrp="1"/>
+          </p:cNvSpPr>
+          <p:nvPr>
+            <p:ph type="sldNum" sz="quarter" idx="12"/>
+          </p:nvPr>
+        </p:nvSpPr>
+        <p:spPr/>
+        <p:txBody>
+          <a:bodyPr/>
+          <a:lstStyle/>
+          <a:p>
+            <a:fld id="{1374FF4F-7CE3-4DCA-8B74-8358E6AEE92B}" type="slidenum">
+              <a:rPr lang="ru-RU" smtClean="0"/>
+              <a:t>3</a:t>
+            </a:fld>
+            <a:endParaRPr lang="ru-RU"/>
+          </a:p>
+        </p:txBody>
+      </p:sp>
     </p:spTree>
     <p:extLst>
       <p:ext uri="{BB962C8B-B14F-4D97-AF65-F5344CB8AC3E}">
@@ -5443,6 +5325,29 @@
           </a:p>
         </p:txBody>
       </p:sp>
+      <p:sp>
+        <p:nvSpPr>
+          <p:cNvPr id="5" name="Номер слайда 4"/>
+          <p:cNvSpPr>
+            <a:spLocks noGrp="1"/>
+          </p:cNvSpPr>
+          <p:nvPr>
+            <p:ph type="sldNum" sz="quarter" idx="12"/>
+          </p:nvPr>
+        </p:nvSpPr>
+        <p:spPr/>
+        <p:txBody>
+          <a:bodyPr/>
+          <a:lstStyle/>
+          <a:p>
+            <a:fld id="{1374FF4F-7CE3-4DCA-8B74-8358E6AEE92B}" type="slidenum">
+              <a:rPr lang="ru-RU" smtClean="0"/>
+              <a:t>4</a:t>
+            </a:fld>
+            <a:endParaRPr lang="ru-RU"/>
+          </a:p>
+        </p:txBody>
+      </p:sp>
     </p:spTree>
     <p:extLst>
       <p:ext uri="{BB962C8B-B14F-4D97-AF65-F5344CB8AC3E}">
@@ -5558,6 +5463,29 @@
           </a:prstGeom>
         </p:spPr>
       </p:pic>
+      <p:sp>
+        <p:nvSpPr>
+          <p:cNvPr id="6" name="Номер слайда 5"/>
+          <p:cNvSpPr>
+            <a:spLocks noGrp="1"/>
+          </p:cNvSpPr>
+          <p:nvPr>
+            <p:ph type="sldNum" sz="quarter" idx="12"/>
+          </p:nvPr>
+        </p:nvSpPr>
+        <p:spPr/>
+        <p:txBody>
+          <a:bodyPr/>
+          <a:lstStyle/>
+          <a:p>
+            <a:fld id="{1374FF4F-7CE3-4DCA-8B74-8358E6AEE92B}" type="slidenum">
+              <a:rPr lang="ru-RU" smtClean="0"/>
+              <a:t>5</a:t>
+            </a:fld>
+            <a:endParaRPr lang="ru-RU"/>
+          </a:p>
+        </p:txBody>
+      </p:sp>
     </p:spTree>
     <p:extLst>
       <p:ext uri="{BB962C8B-B14F-4D97-AF65-F5344CB8AC3E}">
@@ -5737,6 +5665,29 @@
           </a:xfrm>
         </p:spPr>
       </p:pic>
+      <p:sp>
+        <p:nvSpPr>
+          <p:cNvPr id="4" name="Номер слайда 3"/>
+          <p:cNvSpPr>
+            <a:spLocks noGrp="1"/>
+          </p:cNvSpPr>
+          <p:nvPr>
+            <p:ph type="sldNum" sz="quarter" idx="12"/>
+          </p:nvPr>
+        </p:nvSpPr>
+        <p:spPr/>
+        <p:txBody>
+          <a:bodyPr/>
+          <a:lstStyle/>
+          <a:p>
+            <a:fld id="{1374FF4F-7CE3-4DCA-8B74-8358E6AEE92B}" type="slidenum">
+              <a:rPr lang="ru-RU" smtClean="0"/>
+              <a:t>6</a:t>
+            </a:fld>
+            <a:endParaRPr lang="ru-RU"/>
+          </a:p>
+        </p:txBody>
+      </p:sp>
     </p:spTree>
     <p:extLst>
       <p:ext uri="{BB962C8B-B14F-4D97-AF65-F5344CB8AC3E}">
@@ -5970,6 +5921,29 @@
           </a:xfrm>
         </p:spPr>
       </p:pic>
+      <p:sp>
+        <p:nvSpPr>
+          <p:cNvPr id="4" name="Номер слайда 3"/>
+          <p:cNvSpPr>
+            <a:spLocks noGrp="1"/>
+          </p:cNvSpPr>
+          <p:nvPr>
+            <p:ph type="sldNum" sz="quarter" idx="12"/>
+          </p:nvPr>
+        </p:nvSpPr>
+        <p:spPr/>
+        <p:txBody>
+          <a:bodyPr/>
+          <a:lstStyle/>
+          <a:p>
+            <a:fld id="{1374FF4F-7CE3-4DCA-8B74-8358E6AEE92B}" type="slidenum">
+              <a:rPr lang="ru-RU" smtClean="0"/>
+              <a:t>7</a:t>
+            </a:fld>
+            <a:endParaRPr lang="ru-RU"/>
+          </a:p>
+        </p:txBody>
+      </p:sp>
     </p:spTree>
     <p:extLst>
       <p:ext uri="{BB962C8B-B14F-4D97-AF65-F5344CB8AC3E}">
@@ -6112,6 +6086,29 @@
           </a:p>
         </p:txBody>
       </p:sp>
+      <p:sp>
+        <p:nvSpPr>
+          <p:cNvPr id="6" name="Номер слайда 5"/>
+          <p:cNvSpPr>
+            <a:spLocks noGrp="1"/>
+          </p:cNvSpPr>
+          <p:nvPr>
+            <p:ph type="sldNum" sz="quarter" idx="12"/>
+          </p:nvPr>
+        </p:nvSpPr>
+        <p:spPr/>
+        <p:txBody>
+          <a:bodyPr/>
+          <a:lstStyle/>
+          <a:p>
+            <a:fld id="{1374FF4F-7CE3-4DCA-8B74-8358E6AEE92B}" type="slidenum">
+              <a:rPr lang="ru-RU" smtClean="0"/>
+              <a:t>8</a:t>
+            </a:fld>
+            <a:endParaRPr lang="ru-RU"/>
+          </a:p>
+        </p:txBody>
+      </p:sp>
     </p:spTree>
     <p:extLst>
       <p:ext uri="{BB962C8B-B14F-4D97-AF65-F5344CB8AC3E}">
@@ -6236,6 +6233,29 @@
           </a:xfrm>
         </p:spPr>
       </p:pic>
+      <p:sp>
+        <p:nvSpPr>
+          <p:cNvPr id="4" name="Номер слайда 3"/>
+          <p:cNvSpPr>
+            <a:spLocks noGrp="1"/>
+          </p:cNvSpPr>
+          <p:nvPr>
+            <p:ph type="sldNum" sz="quarter" idx="12"/>
+          </p:nvPr>
+        </p:nvSpPr>
+        <p:spPr/>
+        <p:txBody>
+          <a:bodyPr/>
+          <a:lstStyle/>
+          <a:p>
+            <a:fld id="{1374FF4F-7CE3-4DCA-8B74-8358E6AEE92B}" type="slidenum">
+              <a:rPr lang="ru-RU" smtClean="0"/>
+              <a:t>9</a:t>
+            </a:fld>
+            <a:endParaRPr lang="ru-RU"/>
+          </a:p>
+        </p:txBody>
+      </p:sp>
     </p:spTree>
     <p:extLst>
       <p:ext uri="{BB962C8B-B14F-4D97-AF65-F5344CB8AC3E}">
@@ -6299,7 +6319,7 @@
     </a:clrScheme>
     <a:fontScheme name="Стандартная">
       <a:majorFont>
-        <a:latin typeface="Calibri Light" panose="020F0302020204030204"/>
+        <a:latin typeface="Calibri Light"/>
         <a:ea typeface=""/>
         <a:cs typeface=""/>
         <a:font script="Jpan" typeface="ＭＳ Ｐゴシック"/>
@@ -6334,7 +6354,7 @@
         <a:font script="Geor" typeface="Sylfaen"/>
       </a:majorFont>
       <a:minorFont>
-        <a:latin typeface="Calibri" panose="020F0502020204030204"/>
+        <a:latin typeface="Calibri"/>
         <a:ea typeface=""/>
         <a:cs typeface=""/>
         <a:font script="Jpan" typeface="ＭＳ Ｐゴシック"/>
@@ -6511,7 +6531,7 @@
   <a:extraClrSchemeLst/>
   <a:extLst>
     <a:ext uri="{05A4C25C-085E-4340-85A3-A5531E510DB2}">
-      <thm15:themeFamily xmlns:thm15="http://schemas.microsoft.com/office/thememl/2012/main" name="Office Theme" id="{62F939B6-93AF-4DB8-9C6B-D6C7DFDC589F}" vid="{4A3C46E8-61CC-4603-A589-7422A47A8E4A}"/>
+      <thm15:themeFamily xmlns:thm15="http://schemas.microsoft.com/office/thememl/2012/main" xmlns="" name="Office Theme" id="{62F939B6-93AF-4DB8-9C6B-D6C7DFDC589F}" vid="{4A3C46E8-61CC-4603-A589-7422A47A8E4A}"/>
     </a:ext>
   </a:extLst>
 </a:theme>
@@ -6560,7 +6580,7 @@
     </a:clrScheme>
     <a:fontScheme name="Стандартная">
       <a:majorFont>
-        <a:latin typeface="Calibri Light" panose="020F0302020204030204"/>
+        <a:latin typeface="Calibri Light"/>
         <a:ea typeface=""/>
         <a:cs typeface=""/>
         <a:font script="Jpan" typeface="ＭＳ Ｐゴシック"/>
@@ -6595,7 +6615,7 @@
         <a:font script="Geor" typeface="Sylfaen"/>
       </a:majorFont>
       <a:minorFont>
-        <a:latin typeface="Calibri" panose="020F0502020204030204"/>
+        <a:latin typeface="Calibri"/>
         <a:ea typeface=""/>
         <a:cs typeface=""/>
         <a:font script="Jpan" typeface="ＭＳ Ｐゴシック"/>
@@ -6772,7 +6792,7 @@
   <a:extraClrSchemeLst/>
   <a:extLst>
     <a:ext uri="{05A4C25C-085E-4340-85A3-A5531E510DB2}">
-      <thm15:themeFamily xmlns:thm15="http://schemas.microsoft.com/office/thememl/2012/main" name="Office Theme" id="{62F939B6-93AF-4DB8-9C6B-D6C7DFDC589F}" vid="{4A3C46E8-61CC-4603-A589-7422A47A8E4A}"/>
+      <thm15:themeFamily xmlns:thm15="http://schemas.microsoft.com/office/thememl/2012/main" xmlns="" name="Office Theme" id="{62F939B6-93AF-4DB8-9C6B-D6C7DFDC589F}" vid="{4A3C46E8-61CC-4603-A589-7422A47A8E4A}"/>
     </a:ext>
   </a:extLst>
 </a:theme>

</xml_diff>